<commit_message>
add some doc, modify logo
</commit_message>
<xml_diff>
--- a/doc/自研处理器的实践：SWIFT 开发经验分享.pptx
+++ b/doc/自研处理器的实践：SWIFT 开发经验分享.pptx
@@ -7,6 +7,12 @@
   <p:sldIdLst>
     <p:sldId id="256" r:id="rId2"/>
     <p:sldId id="257" r:id="rId3"/>
+    <p:sldId id="258" r:id="rId4"/>
+    <p:sldId id="259" r:id="rId5"/>
+    <p:sldId id="260" r:id="rId6"/>
+    <p:sldId id="261" r:id="rId7"/>
+    <p:sldId id="262" r:id="rId8"/>
+    <p:sldId id="263" r:id="rId9"/>
   </p:sldIdLst>
   <p:sldSz cx="12192000" cy="6858000"/>
   <p:notesSz cx="6858000" cy="9144000"/>
@@ -105,6 +111,11 @@
       </a:defRPr>
     </a:lvl9pPr>
   </p:defaultTextStyle>
+  <p:extLst>
+    <p:ext uri="{EFAFB233-063F-42B5-8137-9DF3F51BA10A}">
+      <p15:sldGuideLst xmlns:p15="http://schemas.microsoft.com/office/powerpoint/2012/main"/>
+    </p:ext>
+  </p:extLst>
 </p:presentation>
 </file>
 
@@ -570,7 +581,7 @@
           <a:p>
             <a:fld id="{397619FB-01C6-4843-B64F-D5EBF9B035DF}" type="datetimeFigureOut">
               <a:rPr lang="zh-CN" altLang="en-US" smtClean="0"/>
-              <a:t>2024/12/3</a:t>
+              <a:t>2024/12/5</a:t>
             </a:fld>
             <a:endParaRPr lang="zh-CN" altLang="en-US"/>
           </a:p>
@@ -772,7 +783,7 @@
           <a:p>
             <a:fld id="{397619FB-01C6-4843-B64F-D5EBF9B035DF}" type="datetimeFigureOut">
               <a:rPr lang="zh-CN" altLang="en-US" smtClean="0"/>
-              <a:t>2024/12/3</a:t>
+              <a:t>2024/12/5</a:t>
             </a:fld>
             <a:endParaRPr lang="zh-CN" altLang="en-US"/>
           </a:p>
@@ -952,7 +963,7 @@
           <a:p>
             <a:fld id="{397619FB-01C6-4843-B64F-D5EBF9B035DF}" type="datetimeFigureOut">
               <a:rPr lang="zh-CN" altLang="en-US" smtClean="0"/>
-              <a:t>2024/12/3</a:t>
+              <a:t>2024/12/5</a:t>
             </a:fld>
             <a:endParaRPr lang="zh-CN" altLang="en-US"/>
           </a:p>
@@ -1122,7 +1133,7 @@
           <a:p>
             <a:fld id="{397619FB-01C6-4843-B64F-D5EBF9B035DF}" type="datetimeFigureOut">
               <a:rPr lang="zh-CN" altLang="en-US" smtClean="0"/>
-              <a:t>2024/12/3</a:t>
+              <a:t>2024/12/5</a:t>
             </a:fld>
             <a:endParaRPr lang="zh-CN" altLang="en-US"/>
           </a:p>
@@ -1693,7 +1704,7 @@
           <a:p>
             <a:fld id="{397619FB-01C6-4843-B64F-D5EBF9B035DF}" type="datetimeFigureOut">
               <a:rPr lang="zh-CN" altLang="en-US" smtClean="0"/>
-              <a:t>2024/12/3</a:t>
+              <a:t>2024/12/5</a:t>
             </a:fld>
             <a:endParaRPr lang="zh-CN" altLang="en-US"/>
           </a:p>
@@ -1995,7 +2006,7 @@
           <a:p>
             <a:fld id="{397619FB-01C6-4843-B64F-D5EBF9B035DF}" type="datetimeFigureOut">
               <a:rPr lang="zh-CN" altLang="en-US" smtClean="0"/>
-              <a:t>2024/12/3</a:t>
+              <a:t>2024/12/5</a:t>
             </a:fld>
             <a:endParaRPr lang="zh-CN" altLang="en-US"/>
           </a:p>
@@ -2432,7 +2443,7 @@
           <a:p>
             <a:fld id="{397619FB-01C6-4843-B64F-D5EBF9B035DF}" type="datetimeFigureOut">
               <a:rPr lang="zh-CN" altLang="en-US" smtClean="0"/>
-              <a:t>2024/12/3</a:t>
+              <a:t>2024/12/5</a:t>
             </a:fld>
             <a:endParaRPr lang="zh-CN" altLang="en-US"/>
           </a:p>
@@ -2550,7 +2561,7 @@
           <a:p>
             <a:fld id="{397619FB-01C6-4843-B64F-D5EBF9B035DF}" type="datetimeFigureOut">
               <a:rPr lang="zh-CN" altLang="en-US" smtClean="0"/>
-              <a:t>2024/12/3</a:t>
+              <a:t>2024/12/5</a:t>
             </a:fld>
             <a:endParaRPr lang="zh-CN" altLang="en-US"/>
           </a:p>
@@ -2645,7 +2656,7 @@
           <a:p>
             <a:fld id="{397619FB-01C6-4843-B64F-D5EBF9B035DF}" type="datetimeFigureOut">
               <a:rPr lang="zh-CN" altLang="en-US" smtClean="0"/>
-              <a:t>2024/12/3</a:t>
+              <a:t>2024/12/5</a:t>
             </a:fld>
             <a:endParaRPr lang="zh-CN" altLang="en-US"/>
           </a:p>
@@ -3027,7 +3038,7 @@
           <a:p>
             <a:fld id="{397619FB-01C6-4843-B64F-D5EBF9B035DF}" type="datetimeFigureOut">
               <a:rPr lang="zh-CN" altLang="en-US" smtClean="0"/>
-              <a:t>2024/12/3</a:t>
+              <a:t>2024/12/5</a:t>
             </a:fld>
             <a:endParaRPr lang="zh-CN" altLang="en-US"/>
           </a:p>
@@ -3421,7 +3432,7 @@
           <a:p>
             <a:fld id="{397619FB-01C6-4843-B64F-D5EBF9B035DF}" type="datetimeFigureOut">
               <a:rPr lang="zh-CN" altLang="en-US" smtClean="0"/>
-              <a:t>2024/12/3</a:t>
+              <a:t>2024/12/5</a:t>
             </a:fld>
             <a:endParaRPr lang="zh-CN" altLang="en-US"/>
           </a:p>
@@ -3734,7 +3745,7 @@
           <a:p>
             <a:fld id="{397619FB-01C6-4843-B64F-D5EBF9B035DF}" type="datetimeFigureOut">
               <a:rPr lang="zh-CN" altLang="en-US" smtClean="0"/>
-              <a:t>2024/12/3</a:t>
+              <a:t>2024/12/5</a:t>
             </a:fld>
             <a:endParaRPr lang="zh-CN" altLang="en-US"/>
           </a:p>
@@ -4322,7 +4333,10 @@
           <a:bodyPr/>
           <a:lstStyle/>
           <a:p>
-            <a:endParaRPr lang="zh-CN" altLang="en-US"/>
+            <a:r>
+              <a:rPr lang="zh-CN" altLang="en-US" dirty="0"/>
+              <a:t>半加器</a:t>
+            </a:r>
           </a:p>
         </p:txBody>
       </p:sp>
@@ -4347,14 +4361,783 @@
           <a:bodyPr/>
           <a:lstStyle/>
           <a:p>
-            <a:endParaRPr lang="zh-CN" altLang="en-US"/>
-          </a:p>
-        </p:txBody>
-      </p:sp>
+            <a:r>
+              <a:rPr lang="zh-CN" altLang="en-US" dirty="0"/>
+              <a:t>半加器用于计算</a:t>
+            </a:r>
+            <a:r>
+              <a:rPr lang="en-US" altLang="zh-CN" dirty="0"/>
+              <a:t>2</a:t>
+            </a:r>
+            <a:r>
+              <a:rPr lang="zh-CN" altLang="en-US" dirty="0"/>
+              <a:t>个单比特二进制数</a:t>
+            </a:r>
+            <a:r>
+              <a:rPr lang="en-US" altLang="zh-CN" dirty="0"/>
+              <a:t>a</a:t>
+            </a:r>
+            <a:r>
+              <a:rPr lang="zh-CN" altLang="en-US" dirty="0"/>
+              <a:t>与</a:t>
+            </a:r>
+            <a:r>
+              <a:rPr lang="en-US" altLang="zh-CN" dirty="0"/>
+              <a:t>b</a:t>
+            </a:r>
+            <a:r>
+              <a:rPr lang="zh-CN" altLang="en-US" dirty="0"/>
+              <a:t>的和，输出结果</a:t>
+            </a:r>
+            <a:r>
+              <a:rPr lang="en-US" altLang="zh-CN" dirty="0"/>
+              <a:t>sum(s)</a:t>
+            </a:r>
+            <a:r>
+              <a:rPr lang="zh-CN" altLang="en-US" dirty="0"/>
+              <a:t>和进位</a:t>
+            </a:r>
+            <a:r>
+              <a:rPr lang="en-US" altLang="zh-CN" dirty="0"/>
+              <a:t>carry(c)</a:t>
+            </a:r>
+            <a:r>
+              <a:rPr lang="zh-CN" altLang="en-US" dirty="0"/>
+              <a:t>。在多比特数的计算中，进位</a:t>
+            </a:r>
+            <a:r>
+              <a:rPr lang="en-US" altLang="zh-CN" dirty="0"/>
+              <a:t>c</a:t>
+            </a:r>
+            <a:r>
+              <a:rPr lang="zh-CN" altLang="en-US" dirty="0"/>
+              <a:t>将作为下一相邻比特的加法运算中。单个半加器的计算结果是</a:t>
+            </a:r>
+            <a:r>
+              <a:rPr lang="en-US" altLang="zh-CN" dirty="0"/>
+              <a:t>2c+s</a:t>
+            </a:r>
+            <a:r>
+              <a:rPr lang="zh-CN" altLang="en-US" dirty="0"/>
+              <a:t>。它的真值表、逻辑表达式如下所示：</a:t>
+            </a:r>
+            <a:endParaRPr lang="en-US" altLang="zh-CN" dirty="0"/>
+          </a:p>
+          <a:p>
+            <a:r>
+              <a:rPr lang="en-US" altLang="zh-CN" dirty="0"/>
+              <a:t>S = </a:t>
+            </a:r>
+            <a:r>
+              <a:rPr lang="en-US" altLang="zh-CN" dirty="0" err="1"/>
+              <a:t>a’b+ab</a:t>
+            </a:r>
+            <a:r>
+              <a:rPr lang="en-US" altLang="zh-CN" dirty="0"/>
+              <a:t>’</a:t>
+            </a:r>
+          </a:p>
+          <a:p>
+            <a:r>
+              <a:rPr lang="en-US" altLang="zh-CN" dirty="0"/>
+              <a:t>C = ab</a:t>
+            </a:r>
+            <a:endParaRPr lang="zh-CN" altLang="en-US" dirty="0"/>
+          </a:p>
+        </p:txBody>
+      </p:sp>
+      <p:pic>
+        <p:nvPicPr>
+          <p:cNvPr id="5" name="图片 4">
+            <a:extLst>
+              <a:ext uri="{FF2B5EF4-FFF2-40B4-BE49-F238E27FC236}">
+                <a16:creationId xmlns:a16="http://schemas.microsoft.com/office/drawing/2014/main" id="{9511E767-1BF8-4247-B0B3-1E8476B6E4C1}"/>
+              </a:ext>
+            </a:extLst>
+          </p:cNvPr>
+          <p:cNvPicPr>
+            <a:picLocks noChangeAspect="1"/>
+          </p:cNvPicPr>
+          <p:nvPr/>
+        </p:nvPicPr>
+        <p:blipFill>
+          <a:blip r:embed="rId2"/>
+          <a:stretch>
+            <a:fillRect/>
+          </a:stretch>
+        </p:blipFill>
+        <p:spPr>
+          <a:xfrm>
+            <a:off x="3636962" y="3930258"/>
+            <a:ext cx="4918075" cy="2435008"/>
+          </a:xfrm>
+          <a:prstGeom prst="rect">
+            <a:avLst/>
+          </a:prstGeom>
+        </p:spPr>
+      </p:pic>
     </p:spTree>
     <p:extLst>
       <p:ext uri="{BB962C8B-B14F-4D97-AF65-F5344CB8AC3E}">
         <p14:creationId xmlns:p14="http://schemas.microsoft.com/office/powerpoint/2010/main" val="925349434"/>
+      </p:ext>
+    </p:extLst>
+  </p:cSld>
+  <p:clrMapOvr>
+    <a:masterClrMapping/>
+  </p:clrMapOvr>
+</p:sld>
+</file>
+
+<file path=ppt/slides/slide3.xml><?xml version="1.0" encoding="utf-8"?>
+<p:sld xmlns:a="http://schemas.openxmlformats.org/drawingml/2006/main" xmlns:r="http://schemas.openxmlformats.org/officeDocument/2006/relationships" xmlns:p="http://schemas.openxmlformats.org/presentationml/2006/main">
+  <p:cSld>
+    <p:spTree>
+      <p:nvGrpSpPr>
+        <p:cNvPr id="1" name=""/>
+        <p:cNvGrpSpPr/>
+        <p:nvPr/>
+      </p:nvGrpSpPr>
+      <p:grpSpPr>
+        <a:xfrm>
+          <a:off x="0" y="0"/>
+          <a:ext cx="0" cy="0"/>
+          <a:chOff x="0" y="0"/>
+          <a:chExt cx="0" cy="0"/>
+        </a:xfrm>
+      </p:grpSpPr>
+      <p:sp>
+        <p:nvSpPr>
+          <p:cNvPr id="2" name="标题 1">
+            <a:extLst>
+              <a:ext uri="{FF2B5EF4-FFF2-40B4-BE49-F238E27FC236}">
+                <a16:creationId xmlns:a16="http://schemas.microsoft.com/office/drawing/2014/main" id="{5656501C-FB06-44EB-BB6B-AB5F9DC89EE0}"/>
+              </a:ext>
+            </a:extLst>
+          </p:cNvPr>
+          <p:cNvSpPr>
+            <a:spLocks noGrp="1"/>
+          </p:cNvSpPr>
+          <p:nvPr>
+            <p:ph type="title"/>
+          </p:nvPr>
+        </p:nvSpPr>
+        <p:spPr/>
+        <p:txBody>
+          <a:bodyPr/>
+          <a:lstStyle/>
+          <a:p>
+            <a:r>
+              <a:rPr lang="zh-CN" altLang="en-US" dirty="0"/>
+              <a:t>全加器</a:t>
+            </a:r>
+          </a:p>
+        </p:txBody>
+      </p:sp>
+      <p:sp>
+        <p:nvSpPr>
+          <p:cNvPr id="3" name="内容占位符 2">
+            <a:extLst>
+              <a:ext uri="{FF2B5EF4-FFF2-40B4-BE49-F238E27FC236}">
+                <a16:creationId xmlns:a16="http://schemas.microsoft.com/office/drawing/2014/main" id="{0FE6A5C6-B4D7-42FF-AF68-29CA32361705}"/>
+              </a:ext>
+            </a:extLst>
+          </p:cNvPr>
+          <p:cNvSpPr>
+            <a:spLocks noGrp="1"/>
+          </p:cNvSpPr>
+          <p:nvPr>
+            <p:ph idx="1"/>
+          </p:nvPr>
+        </p:nvSpPr>
+        <p:spPr/>
+        <p:txBody>
+          <a:bodyPr/>
+          <a:lstStyle/>
+          <a:p>
+            <a:r>
+              <a:rPr lang="zh-CN" altLang="en-US" dirty="0"/>
+              <a:t>全加器不同于半加器的地方是全加器带有进位</a:t>
+            </a:r>
+            <a:r>
+              <a:rPr lang="en-US" altLang="zh-CN" dirty="0" err="1"/>
+              <a:t>cin</a:t>
+            </a:r>
+            <a:r>
+              <a:rPr lang="zh-CN" altLang="en-US" dirty="0"/>
+              <a:t>，输入为</a:t>
+            </a:r>
+            <a:r>
+              <a:rPr lang="en-US" altLang="zh-CN" dirty="0" err="1"/>
+              <a:t>a,b,cin</a:t>
+            </a:r>
+            <a:r>
+              <a:rPr lang="zh-CN" altLang="en-US" dirty="0"/>
+              <a:t>，输出为</a:t>
+            </a:r>
+            <a:r>
+              <a:rPr lang="en-US" altLang="zh-CN" dirty="0"/>
+              <a:t>sum(s)</a:t>
+            </a:r>
+            <a:r>
+              <a:rPr lang="zh-CN" altLang="en-US" dirty="0"/>
+              <a:t>和</a:t>
+            </a:r>
+            <a:r>
+              <a:rPr lang="en-US" altLang="zh-CN" dirty="0"/>
+              <a:t>carry(</a:t>
+            </a:r>
+            <a:r>
+              <a:rPr lang="en-US" altLang="zh-CN" dirty="0" err="1"/>
+              <a:t>cout</a:t>
+            </a:r>
+            <a:r>
+              <a:rPr lang="en-US" altLang="zh-CN" dirty="0"/>
+              <a:t>)</a:t>
+            </a:r>
+            <a:r>
+              <a:rPr lang="zh-CN" altLang="en-US" dirty="0"/>
+              <a:t>，均是单比特信号。</a:t>
+            </a:r>
+            <a:r>
+              <a:rPr lang="en-US" altLang="zh-CN" dirty="0"/>
+              <a:t>S</a:t>
+            </a:r>
+            <a:r>
+              <a:rPr lang="zh-CN" altLang="en-US" dirty="0"/>
+              <a:t>为</a:t>
+            </a:r>
+            <a:r>
+              <a:rPr lang="en-US" altLang="zh-CN" dirty="0"/>
+              <a:t>a b </a:t>
+            </a:r>
+            <a:r>
+              <a:rPr lang="en-US" altLang="zh-CN" dirty="0" err="1"/>
+              <a:t>cin</a:t>
+            </a:r>
+            <a:r>
+              <a:rPr lang="zh-CN" altLang="en-US" dirty="0"/>
+              <a:t>三个单比特数的和。</a:t>
+            </a:r>
+            <a:r>
+              <a:rPr lang="en-US" altLang="zh-CN" dirty="0" err="1"/>
+              <a:t>Cout</a:t>
+            </a:r>
+            <a:r>
+              <a:rPr lang="zh-CN" altLang="en-US" dirty="0"/>
+              <a:t>为</a:t>
+            </a:r>
+            <a:r>
+              <a:rPr lang="en-US" altLang="zh-CN" dirty="0" err="1"/>
+              <a:t>a,b,cin</a:t>
+            </a:r>
+            <a:r>
+              <a:rPr lang="zh-CN" altLang="en-US" dirty="0"/>
+              <a:t>三个数超过</a:t>
+            </a:r>
+            <a:r>
+              <a:rPr lang="en-US" altLang="zh-CN" dirty="0"/>
+              <a:t>2</a:t>
+            </a:r>
+            <a:r>
+              <a:rPr lang="zh-CN" altLang="en-US" dirty="0"/>
+              <a:t>以后的进位。真值表和逻辑表达式如下：</a:t>
+            </a:r>
+            <a:endParaRPr lang="en-US" altLang="zh-CN" dirty="0"/>
+          </a:p>
+          <a:p>
+            <a:r>
+              <a:rPr lang="en-US" altLang="zh-CN" dirty="0"/>
+              <a:t>S=</a:t>
+            </a:r>
+            <a:r>
+              <a:rPr lang="en-US" altLang="zh-CN" dirty="0" err="1"/>
+              <a:t>a^b^c</a:t>
+            </a:r>
+            <a:endParaRPr lang="en-US" altLang="zh-CN" dirty="0"/>
+          </a:p>
+          <a:p>
+            <a:r>
+              <a:rPr lang="en-US" altLang="zh-CN" dirty="0" err="1"/>
+              <a:t>Cout</a:t>
+            </a:r>
+            <a:r>
+              <a:rPr lang="en-US" altLang="zh-CN" dirty="0"/>
+              <a:t>=</a:t>
+            </a:r>
+            <a:r>
+              <a:rPr lang="en-US" altLang="zh-CN" dirty="0" err="1"/>
+              <a:t>a&amp;b</a:t>
+            </a:r>
+            <a:r>
+              <a:rPr lang="en-US" altLang="zh-CN" dirty="0"/>
+              <a:t>|(</a:t>
+            </a:r>
+            <a:r>
+              <a:rPr lang="en-US" altLang="zh-CN" dirty="0" err="1"/>
+              <a:t>cin</a:t>
+            </a:r>
+            <a:r>
+              <a:rPr lang="en-US" altLang="zh-CN" dirty="0"/>
+              <a:t>&amp;(</a:t>
+            </a:r>
+            <a:r>
+              <a:rPr lang="en-US" altLang="zh-CN"/>
+              <a:t>a^b))</a:t>
+            </a:r>
+            <a:endParaRPr lang="zh-CN" altLang="en-US" dirty="0"/>
+          </a:p>
+        </p:txBody>
+      </p:sp>
+      <p:pic>
+        <p:nvPicPr>
+          <p:cNvPr id="5" name="图片 4">
+            <a:extLst>
+              <a:ext uri="{FF2B5EF4-FFF2-40B4-BE49-F238E27FC236}">
+                <a16:creationId xmlns:a16="http://schemas.microsoft.com/office/drawing/2014/main" id="{9E66698B-0A3F-4751-BF97-72A507BBCD29}"/>
+              </a:ext>
+            </a:extLst>
+          </p:cNvPr>
+          <p:cNvPicPr>
+            <a:picLocks noChangeAspect="1"/>
+          </p:cNvPicPr>
+          <p:nvPr/>
+        </p:nvPicPr>
+        <p:blipFill>
+          <a:blip r:embed="rId2"/>
+          <a:stretch>
+            <a:fillRect/>
+          </a:stretch>
+        </p:blipFill>
+        <p:spPr>
+          <a:xfrm>
+            <a:off x="4431506" y="3874395"/>
+            <a:ext cx="3328987" cy="2699760"/>
+          </a:xfrm>
+          <a:prstGeom prst="rect">
+            <a:avLst/>
+          </a:prstGeom>
+        </p:spPr>
+      </p:pic>
+    </p:spTree>
+    <p:extLst>
+      <p:ext uri="{BB962C8B-B14F-4D97-AF65-F5344CB8AC3E}">
+        <p14:creationId xmlns:p14="http://schemas.microsoft.com/office/powerpoint/2010/main" val="2530105239"/>
+      </p:ext>
+    </p:extLst>
+  </p:cSld>
+  <p:clrMapOvr>
+    <a:masterClrMapping/>
+  </p:clrMapOvr>
+</p:sld>
+</file>
+
+<file path=ppt/slides/slide4.xml><?xml version="1.0" encoding="utf-8"?>
+<p:sld xmlns:a="http://schemas.openxmlformats.org/drawingml/2006/main" xmlns:r="http://schemas.openxmlformats.org/officeDocument/2006/relationships" xmlns:p="http://schemas.openxmlformats.org/presentationml/2006/main">
+  <p:cSld>
+    <p:spTree>
+      <p:nvGrpSpPr>
+        <p:cNvPr id="1" name=""/>
+        <p:cNvGrpSpPr/>
+        <p:nvPr/>
+      </p:nvGrpSpPr>
+      <p:grpSpPr>
+        <a:xfrm>
+          <a:off x="0" y="0"/>
+          <a:ext cx="0" cy="0"/>
+          <a:chOff x="0" y="0"/>
+          <a:chExt cx="0" cy="0"/>
+        </a:xfrm>
+      </p:grpSpPr>
+      <p:sp>
+        <p:nvSpPr>
+          <p:cNvPr id="2" name="标题 1">
+            <a:extLst>
+              <a:ext uri="{FF2B5EF4-FFF2-40B4-BE49-F238E27FC236}">
+                <a16:creationId xmlns:a16="http://schemas.microsoft.com/office/drawing/2014/main" id="{5656501C-FB06-44EB-BB6B-AB5F9DC89EE0}"/>
+              </a:ext>
+            </a:extLst>
+          </p:cNvPr>
+          <p:cNvSpPr>
+            <a:spLocks noGrp="1"/>
+          </p:cNvSpPr>
+          <p:nvPr>
+            <p:ph type="title"/>
+          </p:nvPr>
+        </p:nvSpPr>
+        <p:spPr/>
+        <p:txBody>
+          <a:bodyPr/>
+          <a:lstStyle/>
+          <a:p>
+            <a:r>
+              <a:rPr lang="zh-CN" altLang="en-US" dirty="0"/>
+              <a:t>半加器</a:t>
+            </a:r>
+          </a:p>
+        </p:txBody>
+      </p:sp>
+      <p:sp>
+        <p:nvSpPr>
+          <p:cNvPr id="3" name="内容占位符 2">
+            <a:extLst>
+              <a:ext uri="{FF2B5EF4-FFF2-40B4-BE49-F238E27FC236}">
+                <a16:creationId xmlns:a16="http://schemas.microsoft.com/office/drawing/2014/main" id="{0FE6A5C6-B4D7-42FF-AF68-29CA32361705}"/>
+              </a:ext>
+            </a:extLst>
+          </p:cNvPr>
+          <p:cNvSpPr>
+            <a:spLocks noGrp="1"/>
+          </p:cNvSpPr>
+          <p:nvPr>
+            <p:ph idx="1"/>
+          </p:nvPr>
+        </p:nvSpPr>
+        <p:spPr/>
+        <p:txBody>
+          <a:bodyPr/>
+          <a:lstStyle/>
+          <a:p>
+            <a:endParaRPr lang="zh-CN" altLang="en-US"/>
+          </a:p>
+        </p:txBody>
+      </p:sp>
+    </p:spTree>
+    <p:extLst>
+      <p:ext uri="{BB962C8B-B14F-4D97-AF65-F5344CB8AC3E}">
+        <p14:creationId xmlns:p14="http://schemas.microsoft.com/office/powerpoint/2010/main" val="3090130437"/>
+      </p:ext>
+    </p:extLst>
+  </p:cSld>
+  <p:clrMapOvr>
+    <a:masterClrMapping/>
+  </p:clrMapOvr>
+</p:sld>
+</file>
+
+<file path=ppt/slides/slide5.xml><?xml version="1.0" encoding="utf-8"?>
+<p:sld xmlns:a="http://schemas.openxmlformats.org/drawingml/2006/main" xmlns:r="http://schemas.openxmlformats.org/officeDocument/2006/relationships" xmlns:p="http://schemas.openxmlformats.org/presentationml/2006/main">
+  <p:cSld>
+    <p:spTree>
+      <p:nvGrpSpPr>
+        <p:cNvPr id="1" name=""/>
+        <p:cNvGrpSpPr/>
+        <p:nvPr/>
+      </p:nvGrpSpPr>
+      <p:grpSpPr>
+        <a:xfrm>
+          <a:off x="0" y="0"/>
+          <a:ext cx="0" cy="0"/>
+          <a:chOff x="0" y="0"/>
+          <a:chExt cx="0" cy="0"/>
+        </a:xfrm>
+      </p:grpSpPr>
+      <p:sp>
+        <p:nvSpPr>
+          <p:cNvPr id="2" name="标题 1">
+            <a:extLst>
+              <a:ext uri="{FF2B5EF4-FFF2-40B4-BE49-F238E27FC236}">
+                <a16:creationId xmlns:a16="http://schemas.microsoft.com/office/drawing/2014/main" id="{5656501C-FB06-44EB-BB6B-AB5F9DC89EE0}"/>
+              </a:ext>
+            </a:extLst>
+          </p:cNvPr>
+          <p:cNvSpPr>
+            <a:spLocks noGrp="1"/>
+          </p:cNvSpPr>
+          <p:nvPr>
+            <p:ph type="title"/>
+          </p:nvPr>
+        </p:nvSpPr>
+        <p:spPr/>
+        <p:txBody>
+          <a:bodyPr/>
+          <a:lstStyle/>
+          <a:p>
+            <a:r>
+              <a:rPr lang="zh-CN" altLang="en-US" dirty="0"/>
+              <a:t>半加器</a:t>
+            </a:r>
+          </a:p>
+        </p:txBody>
+      </p:sp>
+      <p:sp>
+        <p:nvSpPr>
+          <p:cNvPr id="3" name="内容占位符 2">
+            <a:extLst>
+              <a:ext uri="{FF2B5EF4-FFF2-40B4-BE49-F238E27FC236}">
+                <a16:creationId xmlns:a16="http://schemas.microsoft.com/office/drawing/2014/main" id="{0FE6A5C6-B4D7-42FF-AF68-29CA32361705}"/>
+              </a:ext>
+            </a:extLst>
+          </p:cNvPr>
+          <p:cNvSpPr>
+            <a:spLocks noGrp="1"/>
+          </p:cNvSpPr>
+          <p:nvPr>
+            <p:ph idx="1"/>
+          </p:nvPr>
+        </p:nvSpPr>
+        <p:spPr/>
+        <p:txBody>
+          <a:bodyPr/>
+          <a:lstStyle/>
+          <a:p>
+            <a:endParaRPr lang="zh-CN" altLang="en-US"/>
+          </a:p>
+        </p:txBody>
+      </p:sp>
+    </p:spTree>
+    <p:extLst>
+      <p:ext uri="{BB962C8B-B14F-4D97-AF65-F5344CB8AC3E}">
+        <p14:creationId xmlns:p14="http://schemas.microsoft.com/office/powerpoint/2010/main" val="523396548"/>
+      </p:ext>
+    </p:extLst>
+  </p:cSld>
+  <p:clrMapOvr>
+    <a:masterClrMapping/>
+  </p:clrMapOvr>
+</p:sld>
+</file>
+
+<file path=ppt/slides/slide6.xml><?xml version="1.0" encoding="utf-8"?>
+<p:sld xmlns:a="http://schemas.openxmlformats.org/drawingml/2006/main" xmlns:r="http://schemas.openxmlformats.org/officeDocument/2006/relationships" xmlns:p="http://schemas.openxmlformats.org/presentationml/2006/main">
+  <p:cSld>
+    <p:spTree>
+      <p:nvGrpSpPr>
+        <p:cNvPr id="1" name=""/>
+        <p:cNvGrpSpPr/>
+        <p:nvPr/>
+      </p:nvGrpSpPr>
+      <p:grpSpPr>
+        <a:xfrm>
+          <a:off x="0" y="0"/>
+          <a:ext cx="0" cy="0"/>
+          <a:chOff x="0" y="0"/>
+          <a:chExt cx="0" cy="0"/>
+        </a:xfrm>
+      </p:grpSpPr>
+      <p:sp>
+        <p:nvSpPr>
+          <p:cNvPr id="2" name="标题 1">
+            <a:extLst>
+              <a:ext uri="{FF2B5EF4-FFF2-40B4-BE49-F238E27FC236}">
+                <a16:creationId xmlns:a16="http://schemas.microsoft.com/office/drawing/2014/main" id="{5656501C-FB06-44EB-BB6B-AB5F9DC89EE0}"/>
+              </a:ext>
+            </a:extLst>
+          </p:cNvPr>
+          <p:cNvSpPr>
+            <a:spLocks noGrp="1"/>
+          </p:cNvSpPr>
+          <p:nvPr>
+            <p:ph type="title"/>
+          </p:nvPr>
+        </p:nvSpPr>
+        <p:spPr/>
+        <p:txBody>
+          <a:bodyPr/>
+          <a:lstStyle/>
+          <a:p>
+            <a:r>
+              <a:rPr lang="zh-CN" altLang="en-US" dirty="0"/>
+              <a:t>半加器</a:t>
+            </a:r>
+          </a:p>
+        </p:txBody>
+      </p:sp>
+      <p:sp>
+        <p:nvSpPr>
+          <p:cNvPr id="3" name="内容占位符 2">
+            <a:extLst>
+              <a:ext uri="{FF2B5EF4-FFF2-40B4-BE49-F238E27FC236}">
+                <a16:creationId xmlns:a16="http://schemas.microsoft.com/office/drawing/2014/main" id="{0FE6A5C6-B4D7-42FF-AF68-29CA32361705}"/>
+              </a:ext>
+            </a:extLst>
+          </p:cNvPr>
+          <p:cNvSpPr>
+            <a:spLocks noGrp="1"/>
+          </p:cNvSpPr>
+          <p:nvPr>
+            <p:ph idx="1"/>
+          </p:nvPr>
+        </p:nvSpPr>
+        <p:spPr/>
+        <p:txBody>
+          <a:bodyPr/>
+          <a:lstStyle/>
+          <a:p>
+            <a:endParaRPr lang="zh-CN" altLang="en-US"/>
+          </a:p>
+        </p:txBody>
+      </p:sp>
+    </p:spTree>
+    <p:extLst>
+      <p:ext uri="{BB962C8B-B14F-4D97-AF65-F5344CB8AC3E}">
+        <p14:creationId xmlns:p14="http://schemas.microsoft.com/office/powerpoint/2010/main" val="3274463406"/>
+      </p:ext>
+    </p:extLst>
+  </p:cSld>
+  <p:clrMapOvr>
+    <a:masterClrMapping/>
+  </p:clrMapOvr>
+</p:sld>
+</file>
+
+<file path=ppt/slides/slide7.xml><?xml version="1.0" encoding="utf-8"?>
+<p:sld xmlns:a="http://schemas.openxmlformats.org/drawingml/2006/main" xmlns:r="http://schemas.openxmlformats.org/officeDocument/2006/relationships" xmlns:p="http://schemas.openxmlformats.org/presentationml/2006/main">
+  <p:cSld>
+    <p:spTree>
+      <p:nvGrpSpPr>
+        <p:cNvPr id="1" name=""/>
+        <p:cNvGrpSpPr/>
+        <p:nvPr/>
+      </p:nvGrpSpPr>
+      <p:grpSpPr>
+        <a:xfrm>
+          <a:off x="0" y="0"/>
+          <a:ext cx="0" cy="0"/>
+          <a:chOff x="0" y="0"/>
+          <a:chExt cx="0" cy="0"/>
+        </a:xfrm>
+      </p:grpSpPr>
+      <p:sp>
+        <p:nvSpPr>
+          <p:cNvPr id="2" name="标题 1">
+            <a:extLst>
+              <a:ext uri="{FF2B5EF4-FFF2-40B4-BE49-F238E27FC236}">
+                <a16:creationId xmlns:a16="http://schemas.microsoft.com/office/drawing/2014/main" id="{5656501C-FB06-44EB-BB6B-AB5F9DC89EE0}"/>
+              </a:ext>
+            </a:extLst>
+          </p:cNvPr>
+          <p:cNvSpPr>
+            <a:spLocks noGrp="1"/>
+          </p:cNvSpPr>
+          <p:nvPr>
+            <p:ph type="title"/>
+          </p:nvPr>
+        </p:nvSpPr>
+        <p:spPr/>
+        <p:txBody>
+          <a:bodyPr/>
+          <a:lstStyle/>
+          <a:p>
+            <a:r>
+              <a:rPr lang="zh-CN" altLang="en-US" dirty="0"/>
+              <a:t>半加器</a:t>
+            </a:r>
+          </a:p>
+        </p:txBody>
+      </p:sp>
+      <p:sp>
+        <p:nvSpPr>
+          <p:cNvPr id="3" name="内容占位符 2">
+            <a:extLst>
+              <a:ext uri="{FF2B5EF4-FFF2-40B4-BE49-F238E27FC236}">
+                <a16:creationId xmlns:a16="http://schemas.microsoft.com/office/drawing/2014/main" id="{0FE6A5C6-B4D7-42FF-AF68-29CA32361705}"/>
+              </a:ext>
+            </a:extLst>
+          </p:cNvPr>
+          <p:cNvSpPr>
+            <a:spLocks noGrp="1"/>
+          </p:cNvSpPr>
+          <p:nvPr>
+            <p:ph idx="1"/>
+          </p:nvPr>
+        </p:nvSpPr>
+        <p:spPr/>
+        <p:txBody>
+          <a:bodyPr/>
+          <a:lstStyle/>
+          <a:p>
+            <a:endParaRPr lang="zh-CN" altLang="en-US"/>
+          </a:p>
+        </p:txBody>
+      </p:sp>
+    </p:spTree>
+    <p:extLst>
+      <p:ext uri="{BB962C8B-B14F-4D97-AF65-F5344CB8AC3E}">
+        <p14:creationId xmlns:p14="http://schemas.microsoft.com/office/powerpoint/2010/main" val="3406224721"/>
+      </p:ext>
+    </p:extLst>
+  </p:cSld>
+  <p:clrMapOvr>
+    <a:masterClrMapping/>
+  </p:clrMapOvr>
+</p:sld>
+</file>
+
+<file path=ppt/slides/slide8.xml><?xml version="1.0" encoding="utf-8"?>
+<p:sld xmlns:a="http://schemas.openxmlformats.org/drawingml/2006/main" xmlns:r="http://schemas.openxmlformats.org/officeDocument/2006/relationships" xmlns:p="http://schemas.openxmlformats.org/presentationml/2006/main">
+  <p:cSld>
+    <p:spTree>
+      <p:nvGrpSpPr>
+        <p:cNvPr id="1" name=""/>
+        <p:cNvGrpSpPr/>
+        <p:nvPr/>
+      </p:nvGrpSpPr>
+      <p:grpSpPr>
+        <a:xfrm>
+          <a:off x="0" y="0"/>
+          <a:ext cx="0" cy="0"/>
+          <a:chOff x="0" y="0"/>
+          <a:chExt cx="0" cy="0"/>
+        </a:xfrm>
+      </p:grpSpPr>
+      <p:sp>
+        <p:nvSpPr>
+          <p:cNvPr id="2" name="标题 1">
+            <a:extLst>
+              <a:ext uri="{FF2B5EF4-FFF2-40B4-BE49-F238E27FC236}">
+                <a16:creationId xmlns:a16="http://schemas.microsoft.com/office/drawing/2014/main" id="{5656501C-FB06-44EB-BB6B-AB5F9DC89EE0}"/>
+              </a:ext>
+            </a:extLst>
+          </p:cNvPr>
+          <p:cNvSpPr>
+            <a:spLocks noGrp="1"/>
+          </p:cNvSpPr>
+          <p:nvPr>
+            <p:ph type="title"/>
+          </p:nvPr>
+        </p:nvSpPr>
+        <p:spPr/>
+        <p:txBody>
+          <a:bodyPr/>
+          <a:lstStyle/>
+          <a:p>
+            <a:r>
+              <a:rPr lang="zh-CN" altLang="en-US" dirty="0"/>
+              <a:t>半加器</a:t>
+            </a:r>
+          </a:p>
+        </p:txBody>
+      </p:sp>
+      <p:sp>
+        <p:nvSpPr>
+          <p:cNvPr id="3" name="内容占位符 2">
+            <a:extLst>
+              <a:ext uri="{FF2B5EF4-FFF2-40B4-BE49-F238E27FC236}">
+                <a16:creationId xmlns:a16="http://schemas.microsoft.com/office/drawing/2014/main" id="{0FE6A5C6-B4D7-42FF-AF68-29CA32361705}"/>
+              </a:ext>
+            </a:extLst>
+          </p:cNvPr>
+          <p:cNvSpPr>
+            <a:spLocks noGrp="1"/>
+          </p:cNvSpPr>
+          <p:nvPr>
+            <p:ph idx="1"/>
+          </p:nvPr>
+        </p:nvSpPr>
+        <p:spPr/>
+        <p:txBody>
+          <a:bodyPr/>
+          <a:lstStyle/>
+          <a:p>
+            <a:endParaRPr lang="zh-CN" altLang="en-US"/>
+          </a:p>
+        </p:txBody>
+      </p:sp>
+    </p:spTree>
+    <p:extLst>
+      <p:ext uri="{BB962C8B-B14F-4D97-AF65-F5344CB8AC3E}">
+        <p14:creationId xmlns:p14="http://schemas.microsoft.com/office/powerpoint/2010/main" val="2161249065"/>
       </p:ext>
     </p:extLst>
   </p:cSld>

</xml_diff>